<commit_message>
Add test project reference into first lecture
</commit_message>
<xml_diff>
--- a/Lecture1_Korshak.pptx
+++ b/Lecture1_Korshak.pptx
@@ -253,7 +253,7 @@
           <a:p>
             <a:fld id="{CF8C66D5-35F2-4B2B-B66A-28018F619124}" type="datetimeFigureOut">
               <a:rPr lang="en-US" smtClean="0"/>
-              <a:t>4/7/2016</a:t>
+              <a:t>4/8/2016</a:t>
             </a:fld>
             <a:endParaRPr lang="en-US"/>
           </a:p>
@@ -418,7 +418,7 @@
           <a:p>
             <a:fld id="{654B7E8A-1102-47A1-B1C3-36AE88809383}" type="datetimeFigureOut">
               <a:rPr lang="en-US" smtClean="0"/>
-              <a:t>4/7/2016</a:t>
+              <a:t>4/8/2016</a:t>
             </a:fld>
             <a:endParaRPr lang="en-US"/>
           </a:p>
@@ -4480,7 +4480,7 @@
           <a:p>
             <a:fld id="{15D1D4CF-3D6D-4F2B-B799-ACD6AF0610A0}" type="datetime1">
               <a:rPr lang="en-US" smtClean="0"/>
-              <a:t>4/7/2016</a:t>
+              <a:t>4/8/2016</a:t>
             </a:fld>
             <a:endParaRPr lang="en-US"/>
           </a:p>
@@ -4727,7 +4727,7 @@
           <a:p>
             <a:fld id="{29BF70B9-BB69-416F-B644-C5C7D9FC3F97}" type="datetime1">
               <a:rPr lang="en-US" smtClean="0"/>
-              <a:t>4/7/2016</a:t>
+              <a:t>4/8/2016</a:t>
             </a:fld>
             <a:endParaRPr lang="en-US"/>
           </a:p>
@@ -4974,7 +4974,7 @@
           <a:p>
             <a:fld id="{AEA460FC-4A99-4B15-84CA-876BBB675C00}" type="datetime1">
               <a:rPr lang="en-US" smtClean="0"/>
-              <a:t>4/7/2016</a:t>
+              <a:t>4/8/2016</a:t>
             </a:fld>
             <a:endParaRPr lang="en-US"/>
           </a:p>
@@ -5221,7 +5221,7 @@
           <a:p>
             <a:fld id="{FC00D723-BD24-42CD-8711-321A81FD8128}" type="datetime1">
               <a:rPr lang="en-US" smtClean="0"/>
-              <a:t>4/7/2016</a:t>
+              <a:t>4/8/2016</a:t>
             </a:fld>
             <a:endParaRPr lang="en-US"/>
           </a:p>
@@ -5480,7 +5480,7 @@
           <a:p>
             <a:fld id="{2DA59FC9-89C3-4946-936B-DD0F4868072A}" type="datetime1">
               <a:rPr lang="en-US" smtClean="0"/>
-              <a:t>4/7/2016</a:t>
+              <a:t>4/8/2016</a:t>
             </a:fld>
             <a:endParaRPr lang="en-US"/>
           </a:p>
@@ -5843,7 +5843,7 @@
           <a:p>
             <a:fld id="{FF7382F9-6988-4523-9024-A950DA337723}" type="datetime1">
               <a:rPr lang="en-US" smtClean="0"/>
-              <a:t>4/7/2016</a:t>
+              <a:t>4/8/2016</a:t>
             </a:fld>
             <a:endParaRPr lang="en-US"/>
           </a:p>
@@ -6342,7 +6342,7 @@
           <a:p>
             <a:fld id="{6DFC4879-E07B-4FB2-977C-CFCC953348D1}" type="datetime1">
               <a:rPr lang="en-US" smtClean="0"/>
-              <a:t>4/7/2016</a:t>
+              <a:t>4/8/2016</a:t>
             </a:fld>
             <a:endParaRPr lang="en-US"/>
           </a:p>
@@ -6529,7 +6529,7 @@
           <a:p>
             <a:fld id="{4AF29FA8-2185-49EB-B410-1ACFDB0FA35E}" type="datetime1">
               <a:rPr lang="en-US" smtClean="0"/>
-              <a:t>4/7/2016</a:t>
+              <a:t>4/8/2016</a:t>
             </a:fld>
             <a:endParaRPr lang="en-US"/>
           </a:p>
@@ -6685,7 +6685,7 @@
           <a:p>
             <a:fld id="{CEB1C641-58A0-4504-87A4-D46399B02DF3}" type="datetime1">
               <a:rPr lang="en-US" smtClean="0"/>
-              <a:t>4/7/2016</a:t>
+              <a:t>4/8/2016</a:t>
             </a:fld>
             <a:endParaRPr lang="en-US"/>
           </a:p>
@@ -7032,7 +7032,7 @@
           <a:p>
             <a:fld id="{EBD3A6C8-353C-4F04-BE6D-AE9E32B975C6}" type="datetime1">
               <a:rPr lang="en-US" smtClean="0"/>
-              <a:t>4/7/2016</a:t>
+              <a:t>4/8/2016</a:t>
             </a:fld>
             <a:endParaRPr lang="en-US"/>
           </a:p>
@@ -7359,7 +7359,7 @@
           <a:p>
             <a:fld id="{FBC620B5-366C-4D43-9033-91767232AB97}" type="datetime1">
               <a:rPr lang="en-US" smtClean="0"/>
-              <a:t>4/7/2016</a:t>
+              <a:t>4/8/2016</a:t>
             </a:fld>
             <a:endParaRPr lang="en-US"/>
           </a:p>
@@ -7946,7 +7946,7 @@
           <a:p>
             <a:fld id="{A21D24BD-2B1A-4A92-9A1A-079B945EBF85}" type="datetime1">
               <a:rPr lang="en-US" smtClean="0"/>
-              <a:t>4/7/2016</a:t>
+              <a:t>4/8/2016</a:t>
             </a:fld>
             <a:endParaRPr lang="en-US"/>
           </a:p>
@@ -24241,11 +24241,11 @@
   <p:clrMapOvr>
     <a:masterClrMapping/>
   </p:clrMapOvr>
-  <mc:AlternateContent xmlns:mc="http://schemas.openxmlformats.org/markup-compatibility/2006">
-    <mc:Choice xmlns:p14="http://schemas.microsoft.com/office/powerpoint/2010/main" Requires="p14">
+  <mc:AlternateContent xmlns:mc="http://schemas.openxmlformats.org/markup-compatibility/2006" xmlns:p14="http://schemas.microsoft.com/office/powerpoint/2010/main">
+    <mc:Choice Requires="p14">
       <p:transition p14:dur="10" advTm="0"/>
     </mc:Choice>
-    <mc:Fallback>
+    <mc:Fallback xmlns="">
       <p:transition advTm="0"/>
     </mc:Fallback>
   </mc:AlternateContent>
@@ -26700,6 +26700,53 @@
           </a:prstGeom>
         </p:spPr>
       </p:pic>
+      <p:sp>
+        <p:nvSpPr>
+          <p:cNvPr id="12" name="Footer Placeholder 1"/>
+          <p:cNvSpPr>
+            <a:spLocks noGrp="1"/>
+          </p:cNvSpPr>
+          <p:nvPr>
+            <p:ph type="ftr" sz="quarter" idx="3"/>
+          </p:nvPr>
+        </p:nvSpPr>
+        <p:spPr>
+          <a:xfrm>
+            <a:off x="838200" y="6356350"/>
+            <a:ext cx="9428018" cy="365125"/>
+          </a:xfrm>
+        </p:spPr>
+        <p:txBody>
+          <a:bodyPr/>
+          <a:lstStyle/>
+          <a:p>
+            <a:pPr algn="l"/>
+            <a:r>
+              <a:rPr lang="en-US" sz="1600" dirty="0">
+                <a:solidFill>
+                  <a:schemeClr val="tx1"/>
+                </a:solidFill>
+                <a:hlinkClick r:id="rId7"/>
+              </a:rPr>
+              <a:t>https://</a:t>
+            </a:r>
+            <a:r>
+              <a:rPr lang="en-US" sz="1600" dirty="0" smtClean="0">
+                <a:solidFill>
+                  <a:schemeClr val="tx1"/>
+                </a:solidFill>
+                <a:hlinkClick r:id="rId7"/>
+              </a:rPr>
+              <a:t>github.com/GDG-NN/study_jams_android/tree/master/IntroductionApp</a:t>
+            </a:r>
+            <a:endParaRPr lang="en-US" sz="1600" dirty="0">
+              <a:solidFill>
+                <a:schemeClr val="tx1"/>
+              </a:solidFill>
+            </a:endParaRPr>
+          </a:p>
+        </p:txBody>
+      </p:sp>
     </p:spTree>
     <p:extLst>
       <p:ext uri="{BB962C8B-B14F-4D97-AF65-F5344CB8AC3E}">

</xml_diff>